<commit_message>
Add favicon and improve media querry for padding adjustment
</commit_message>
<xml_diff>
--- a/assets/logo.pptx
+++ b/assets/logo.pptx
@@ -6,6 +6,7 @@
   </p:sldMasterIdLst>
   <p:sldIdLst>
     <p:sldId id="256" r:id="rId2"/>
+    <p:sldId id="257" r:id="rId3"/>
   </p:sldIdLst>
   <p:sldSz cx="5943600" cy="2743200"/>
   <p:notesSz cx="9144000" cy="6858000"/>
@@ -104,6 +105,11 @@
       </a:defRPr>
     </a:lvl9pPr>
   </p:defaultTextStyle>
+  <p:extLst>
+    <p:ext uri="{EFAFB233-063F-42B5-8137-9DF3F51BA10A}">
+      <p15:sldGuideLst xmlns:p15="http://schemas.microsoft.com/office/powerpoint/2012/main"/>
+    </p:ext>
+  </p:extLst>
 </p:presentation>
 </file>
 
@@ -238,7 +244,7 @@
           <a:p>
             <a:fld id="{7548D4E5-3282-4F82-8C5B-0DF4CAD02138}" type="datetimeFigureOut">
               <a:rPr lang="en-US" smtClean="0"/>
-              <a:t>10/17/2023</a:t>
+              <a:t>10/18/2023</a:t>
             </a:fld>
             <a:endParaRPr lang="en-US"/>
           </a:p>
@@ -408,7 +414,7 @@
           <a:p>
             <a:fld id="{7548D4E5-3282-4F82-8C5B-0DF4CAD02138}" type="datetimeFigureOut">
               <a:rPr lang="en-US" smtClean="0"/>
-              <a:t>10/17/2023</a:t>
+              <a:t>10/18/2023</a:t>
             </a:fld>
             <a:endParaRPr lang="en-US"/>
           </a:p>
@@ -588,7 +594,7 @@
           <a:p>
             <a:fld id="{7548D4E5-3282-4F82-8C5B-0DF4CAD02138}" type="datetimeFigureOut">
               <a:rPr lang="en-US" smtClean="0"/>
-              <a:t>10/17/2023</a:t>
+              <a:t>10/18/2023</a:t>
             </a:fld>
             <a:endParaRPr lang="en-US"/>
           </a:p>
@@ -758,7 +764,7 @@
           <a:p>
             <a:fld id="{7548D4E5-3282-4F82-8C5B-0DF4CAD02138}" type="datetimeFigureOut">
               <a:rPr lang="en-US" smtClean="0"/>
-              <a:t>10/17/2023</a:t>
+              <a:t>10/18/2023</a:t>
             </a:fld>
             <a:endParaRPr lang="en-US"/>
           </a:p>
@@ -1004,7 +1010,7 @@
           <a:p>
             <a:fld id="{7548D4E5-3282-4F82-8C5B-0DF4CAD02138}" type="datetimeFigureOut">
               <a:rPr lang="en-US" smtClean="0"/>
-              <a:t>10/17/2023</a:t>
+              <a:t>10/18/2023</a:t>
             </a:fld>
             <a:endParaRPr lang="en-US"/>
           </a:p>
@@ -1236,7 +1242,7 @@
           <a:p>
             <a:fld id="{7548D4E5-3282-4F82-8C5B-0DF4CAD02138}" type="datetimeFigureOut">
               <a:rPr lang="en-US" smtClean="0"/>
-              <a:t>10/17/2023</a:t>
+              <a:t>10/18/2023</a:t>
             </a:fld>
             <a:endParaRPr lang="en-US"/>
           </a:p>
@@ -1603,7 +1609,7 @@
           <a:p>
             <a:fld id="{7548D4E5-3282-4F82-8C5B-0DF4CAD02138}" type="datetimeFigureOut">
               <a:rPr lang="en-US" smtClean="0"/>
-              <a:t>10/17/2023</a:t>
+              <a:t>10/18/2023</a:t>
             </a:fld>
             <a:endParaRPr lang="en-US"/>
           </a:p>
@@ -1721,7 +1727,7 @@
           <a:p>
             <a:fld id="{7548D4E5-3282-4F82-8C5B-0DF4CAD02138}" type="datetimeFigureOut">
               <a:rPr lang="en-US" smtClean="0"/>
-              <a:t>10/17/2023</a:t>
+              <a:t>10/18/2023</a:t>
             </a:fld>
             <a:endParaRPr lang="en-US"/>
           </a:p>
@@ -1816,7 +1822,7 @@
           <a:p>
             <a:fld id="{7548D4E5-3282-4F82-8C5B-0DF4CAD02138}" type="datetimeFigureOut">
               <a:rPr lang="en-US" smtClean="0"/>
-              <a:t>10/17/2023</a:t>
+              <a:t>10/18/2023</a:t>
             </a:fld>
             <a:endParaRPr lang="en-US"/>
           </a:p>
@@ -2093,7 +2099,7 @@
           <a:p>
             <a:fld id="{7548D4E5-3282-4F82-8C5B-0DF4CAD02138}" type="datetimeFigureOut">
               <a:rPr lang="en-US" smtClean="0"/>
-              <a:t>10/17/2023</a:t>
+              <a:t>10/18/2023</a:t>
             </a:fld>
             <a:endParaRPr lang="en-US"/>
           </a:p>
@@ -2350,7 +2356,7 @@
           <a:p>
             <a:fld id="{7548D4E5-3282-4F82-8C5B-0DF4CAD02138}" type="datetimeFigureOut">
               <a:rPr lang="en-US" smtClean="0"/>
-              <a:t>10/17/2023</a:t>
+              <a:t>10/18/2023</a:t>
             </a:fld>
             <a:endParaRPr lang="en-US"/>
           </a:p>
@@ -2563,7 +2569,7 @@
           <a:p>
             <a:fld id="{7548D4E5-3282-4F82-8C5B-0DF4CAD02138}" type="datetimeFigureOut">
               <a:rPr lang="en-US" smtClean="0"/>
-              <a:t>10/17/2023</a:t>
+              <a:t>10/18/2023</a:t>
             </a:fld>
             <a:endParaRPr lang="en-US"/>
           </a:p>
@@ -3335,6 +3341,269 @@
 </p:sld>
 </file>
 
+<file path=ppt/slides/slide2.xml><?xml version="1.0" encoding="utf-8"?>
+<p:sld xmlns:a="http://schemas.openxmlformats.org/drawingml/2006/main" xmlns:r="http://schemas.openxmlformats.org/officeDocument/2006/relationships" xmlns:p="http://schemas.openxmlformats.org/presentationml/2006/main">
+  <p:cSld>
+    <p:spTree>
+      <p:nvGrpSpPr>
+        <p:cNvPr id="1" name=""/>
+        <p:cNvGrpSpPr/>
+        <p:nvPr/>
+      </p:nvGrpSpPr>
+      <p:grpSpPr>
+        <a:xfrm>
+          <a:off x="0" y="0"/>
+          <a:ext cx="0" cy="0"/>
+          <a:chOff x="0" y="0"/>
+          <a:chExt cx="0" cy="0"/>
+        </a:xfrm>
+      </p:grpSpPr>
+      <p:sp>
+        <p:nvSpPr>
+          <p:cNvPr id="5" name="TextBox 4">
+            <a:extLst>
+              <a:ext uri="{FF2B5EF4-FFF2-40B4-BE49-F238E27FC236}">
+                <a16:creationId xmlns:a16="http://schemas.microsoft.com/office/drawing/2014/main" id="{8B180923-2FB7-86AC-3757-FD41D86F7876}"/>
+              </a:ext>
+            </a:extLst>
+          </p:cNvPr>
+          <p:cNvSpPr txBox="1"/>
+          <p:nvPr/>
+        </p:nvSpPr>
+        <p:spPr>
+          <a:xfrm>
+            <a:off x="1486611" y="586770"/>
+            <a:ext cx="1485189" cy="1569660"/>
+          </a:xfrm>
+          <a:prstGeom prst="rect">
+            <a:avLst/>
+          </a:prstGeom>
+          <a:noFill/>
+        </p:spPr>
+        <p:txBody>
+          <a:bodyPr wrap="square">
+            <a:spAutoFit/>
+          </a:bodyPr>
+          <a:lstStyle/>
+          <a:p>
+            <a:r>
+              <a:rPr lang="en-US" sz="9600" b="1">
+                <a:solidFill>
+                  <a:schemeClr val="accent5"/>
+                </a:solidFill>
+                <a:latin typeface="Quicksand" panose="00000500000000000000" pitchFamily="2" charset="0"/>
+              </a:rPr>
+              <a:t>Q</a:t>
+            </a:r>
+            <a:endParaRPr lang="en-US"/>
+          </a:p>
+        </p:txBody>
+      </p:sp>
+      <p:grpSp>
+        <p:nvGrpSpPr>
+          <p:cNvPr id="9" name="Group 8">
+            <a:extLst>
+              <a:ext uri="{FF2B5EF4-FFF2-40B4-BE49-F238E27FC236}">
+                <a16:creationId xmlns:a16="http://schemas.microsoft.com/office/drawing/2014/main" id="{55716E03-7E3B-8268-1A26-394C2817E977}"/>
+              </a:ext>
+            </a:extLst>
+          </p:cNvPr>
+          <p:cNvGrpSpPr/>
+          <p:nvPr/>
+        </p:nvGrpSpPr>
+        <p:grpSpPr>
+          <a:xfrm>
+            <a:off x="2586292" y="1458433"/>
+            <a:ext cx="213703" cy="440603"/>
+            <a:chOff x="3167157" y="190822"/>
+            <a:chExt cx="716067" cy="1476356"/>
+          </a:xfrm>
+        </p:grpSpPr>
+        <p:sp>
+          <p:nvSpPr>
+            <p:cNvPr id="6" name="Rectangle: Rounded Corners 5">
+              <a:extLst>
+                <a:ext uri="{FF2B5EF4-FFF2-40B4-BE49-F238E27FC236}">
+                  <a16:creationId xmlns:a16="http://schemas.microsoft.com/office/drawing/2014/main" id="{31E041B2-A080-F21D-06F3-3AD88C8DE203}"/>
+                </a:ext>
+              </a:extLst>
+            </p:cNvPr>
+            <p:cNvSpPr/>
+            <p:nvPr/>
+          </p:nvSpPr>
+          <p:spPr>
+            <a:xfrm rot="13855489">
+              <a:off x="2980219" y="1018492"/>
+              <a:ext cx="1100692" cy="196679"/>
+            </a:xfrm>
+            <a:prstGeom prst="roundRect">
+              <a:avLst>
+                <a:gd name="adj" fmla="val 50000"/>
+              </a:avLst>
+            </a:prstGeom>
+            <a:solidFill>
+              <a:schemeClr val="accent6">
+                <a:lumMod val="40000"/>
+                <a:lumOff val="60000"/>
+              </a:schemeClr>
+            </a:solidFill>
+            <a:ln>
+              <a:noFill/>
+            </a:ln>
+          </p:spPr>
+          <p:style>
+            <a:lnRef idx="2">
+              <a:schemeClr val="accent1">
+                <a:shade val="15000"/>
+              </a:schemeClr>
+            </a:lnRef>
+            <a:fillRef idx="1">
+              <a:schemeClr val="accent1"/>
+            </a:fillRef>
+            <a:effectRef idx="0">
+              <a:schemeClr val="accent1"/>
+            </a:effectRef>
+            <a:fontRef idx="minor">
+              <a:schemeClr val="lt1"/>
+            </a:fontRef>
+          </p:style>
+          <p:txBody>
+            <a:bodyPr rtlCol="0" anchor="ctr"/>
+            <a:lstStyle/>
+            <a:p>
+              <a:pPr algn="ctr"/>
+              <a:endParaRPr lang="en-US" sz="2856"/>
+            </a:p>
+          </p:txBody>
+        </p:sp>
+        <p:sp>
+          <p:nvSpPr>
+            <p:cNvPr id="7" name="Rectangle: Rounded Corners 6">
+              <a:extLst>
+                <a:ext uri="{FF2B5EF4-FFF2-40B4-BE49-F238E27FC236}">
+                  <a16:creationId xmlns:a16="http://schemas.microsoft.com/office/drawing/2014/main" id="{F2130664-B957-9376-348D-DDEED5925453}"/>
+                </a:ext>
+              </a:extLst>
+            </p:cNvPr>
+            <p:cNvSpPr/>
+            <p:nvPr/>
+          </p:nvSpPr>
+          <p:spPr>
+            <a:xfrm rot="13855489">
+              <a:off x="2920679" y="1209448"/>
+              <a:ext cx="689635" cy="196679"/>
+            </a:xfrm>
+            <a:prstGeom prst="roundRect">
+              <a:avLst>
+                <a:gd name="adj" fmla="val 50000"/>
+              </a:avLst>
+            </a:prstGeom>
+            <a:solidFill>
+              <a:schemeClr val="accent6">
+                <a:lumMod val="40000"/>
+                <a:lumOff val="60000"/>
+              </a:schemeClr>
+            </a:solidFill>
+            <a:ln>
+              <a:noFill/>
+            </a:ln>
+          </p:spPr>
+          <p:style>
+            <a:lnRef idx="2">
+              <a:schemeClr val="accent1">
+                <a:shade val="15000"/>
+              </a:schemeClr>
+            </a:lnRef>
+            <a:fillRef idx="1">
+              <a:schemeClr val="accent1"/>
+            </a:fillRef>
+            <a:effectRef idx="0">
+              <a:schemeClr val="accent1"/>
+            </a:effectRef>
+            <a:fontRef idx="minor">
+              <a:schemeClr val="lt1"/>
+            </a:fontRef>
+          </p:style>
+          <p:txBody>
+            <a:bodyPr rtlCol="0" anchor="ctr"/>
+            <a:lstStyle/>
+            <a:p>
+              <a:pPr algn="ctr"/>
+              <a:endParaRPr lang="en-US" sz="2856"/>
+            </a:p>
+          </p:txBody>
+        </p:sp>
+        <p:sp>
+          <p:nvSpPr>
+            <p:cNvPr id="8" name="Rectangle: Rounded Corners 7">
+              <a:extLst>
+                <a:ext uri="{FF2B5EF4-FFF2-40B4-BE49-F238E27FC236}">
+                  <a16:creationId xmlns:a16="http://schemas.microsoft.com/office/drawing/2014/main" id="{2CC9952F-9AAE-A835-D6E5-2768E35BD0A5}"/>
+                </a:ext>
+              </a:extLst>
+            </p:cNvPr>
+            <p:cNvSpPr/>
+            <p:nvPr/>
+          </p:nvSpPr>
+          <p:spPr>
+            <a:xfrm rot="13855489">
+              <a:off x="3081094" y="796273"/>
+              <a:ext cx="1407582" cy="196679"/>
+            </a:xfrm>
+            <a:prstGeom prst="roundRect">
+              <a:avLst>
+                <a:gd name="adj" fmla="val 50000"/>
+              </a:avLst>
+            </a:prstGeom>
+            <a:solidFill>
+              <a:schemeClr val="accent6">
+                <a:lumMod val="40000"/>
+                <a:lumOff val="60000"/>
+              </a:schemeClr>
+            </a:solidFill>
+            <a:ln>
+              <a:noFill/>
+            </a:ln>
+          </p:spPr>
+          <p:style>
+            <a:lnRef idx="2">
+              <a:schemeClr val="accent1">
+                <a:shade val="15000"/>
+              </a:schemeClr>
+            </a:lnRef>
+            <a:fillRef idx="1">
+              <a:schemeClr val="accent1"/>
+            </a:fillRef>
+            <a:effectRef idx="0">
+              <a:schemeClr val="accent1"/>
+            </a:effectRef>
+            <a:fontRef idx="minor">
+              <a:schemeClr val="lt1"/>
+            </a:fontRef>
+          </p:style>
+          <p:txBody>
+            <a:bodyPr rtlCol="0" anchor="ctr"/>
+            <a:lstStyle/>
+            <a:p>
+              <a:pPr algn="ctr"/>
+              <a:endParaRPr lang="en-US" sz="2856"/>
+            </a:p>
+          </p:txBody>
+        </p:sp>
+      </p:grpSp>
+    </p:spTree>
+    <p:extLst>
+      <p:ext uri="{BB962C8B-B14F-4D97-AF65-F5344CB8AC3E}">
+        <p14:creationId xmlns:p14="http://schemas.microsoft.com/office/powerpoint/2010/main" val="1984154008"/>
+      </p:ext>
+    </p:extLst>
+  </p:cSld>
+  <p:clrMapOvr>
+    <a:masterClrMapping/>
+  </p:clrMapOvr>
+</p:sld>
+</file>
+
 <file path=ppt/theme/theme1.xml><?xml version="1.0" encoding="utf-8"?>
 <a:theme xmlns:a="http://schemas.openxmlformats.org/drawingml/2006/main" name="Office Theme">
   <a:themeElements>

</xml_diff>